<commit_message>
First draft of powerpoint revised
left 5 tabs logical , pattern use , structure ,interaction view points and db design
</commit_message>
<xml_diff>
--- a/Documentation/revised Content management.pptx
+++ b/Documentation/revised Content management.pptx
@@ -113,6 +113,11 @@
       </a:defRPr>
     </a:lvl9pPr>
   </p:defaultTextStyle>
+  <p:extLst>
+    <p:ext uri="{EFAFB233-063F-42B5-8137-9DF3F51BA10A}">
+      <p15:sldGuideLst xmlns:p15="http://schemas.microsoft.com/office/powerpoint/2012/main"/>
+    </p:ext>
+  </p:extLst>
 </p:presentation>
 </file>
 
@@ -6059,12 +6064,9 @@
             <a:endParaRPr lang="en-US" dirty="0" smtClean="0"/>
           </a:p>
           <a:p>
-            <a:endParaRPr lang="en-US" dirty="0" smtClean="0"/>
-          </a:p>
-          <a:p>
-            <a:r>
-              <a:rPr lang="en-US" smtClean="0"/>
-              <a:t>Image:</a:t>
+            <a:r>
+              <a:rPr lang="en-US" dirty="0" smtClean="0"/>
+              <a:t>Images:</a:t>
             </a:r>
             <a:endParaRPr lang="en-US" dirty="0"/>
           </a:p>
@@ -6073,6 +6075,66 @@
           </a:p>
         </p:txBody>
       </p:sp>
+      <p:pic>
+        <p:nvPicPr>
+          <p:cNvPr id="4" name="Picture 3"/>
+          <p:cNvPicPr>
+            <a:picLocks noChangeAspect="1"/>
+          </p:cNvPicPr>
+          <p:nvPr/>
+        </p:nvPicPr>
+        <p:blipFill>
+          <a:blip r:embed="rId3">
+            <a:extLst>
+              <a:ext uri="{28A0092B-C50C-407E-A947-70E740481C1C}">
+                <a14:useLocalDpi xmlns:a14="http://schemas.microsoft.com/office/drawing/2010/main" val="0"/>
+              </a:ext>
+            </a:extLst>
+          </a:blip>
+          <a:stretch>
+            <a:fillRect/>
+          </a:stretch>
+        </p:blipFill>
+        <p:spPr>
+          <a:xfrm>
+            <a:off x="740304" y="2860977"/>
+            <a:ext cx="5233160" cy="3644056"/>
+          </a:xfrm>
+          <a:prstGeom prst="rect">
+            <a:avLst/>
+          </a:prstGeom>
+        </p:spPr>
+      </p:pic>
+      <p:pic>
+        <p:nvPicPr>
+          <p:cNvPr id="5" name="Picture 4"/>
+          <p:cNvPicPr>
+            <a:picLocks noChangeAspect="1"/>
+          </p:cNvPicPr>
+          <p:nvPr/>
+        </p:nvPicPr>
+        <p:blipFill>
+          <a:blip r:embed="rId4">
+            <a:extLst>
+              <a:ext uri="{28A0092B-C50C-407E-A947-70E740481C1C}">
+                <a14:useLocalDpi xmlns:a14="http://schemas.microsoft.com/office/drawing/2010/main" val="0"/>
+              </a:ext>
+            </a:extLst>
+          </a:blip>
+          <a:stretch>
+            <a:fillRect/>
+          </a:stretch>
+        </p:blipFill>
+        <p:spPr>
+          <a:xfrm>
+            <a:off x="6071360" y="2860977"/>
+            <a:ext cx="5380336" cy="3644057"/>
+          </a:xfrm>
+          <a:prstGeom prst="rect">
+            <a:avLst/>
+          </a:prstGeom>
+        </p:spPr>
+      </p:pic>
     </p:spTree>
     <p:extLst>
       <p:ext uri="{BB962C8B-B14F-4D97-AF65-F5344CB8AC3E}">

</xml_diff>

<commit_message>
Update revised Content management.pptx
</commit_message>
<xml_diff>
--- a/Documentation/revised Content management.pptx
+++ b/Documentation/revised Content management.pptx
@@ -17,15 +17,14 @@
     <p:sldId id="262" r:id="rId11"/>
     <p:sldId id="275" r:id="rId12"/>
     <p:sldId id="276" r:id="rId13"/>
-    <p:sldId id="277" r:id="rId14"/>
-    <p:sldId id="263" r:id="rId15"/>
-    <p:sldId id="268" r:id="rId16"/>
-    <p:sldId id="269" r:id="rId17"/>
-    <p:sldId id="270" r:id="rId18"/>
-    <p:sldId id="264" r:id="rId19"/>
-    <p:sldId id="265" r:id="rId20"/>
-    <p:sldId id="271" r:id="rId21"/>
-    <p:sldId id="272" r:id="rId22"/>
+    <p:sldId id="263" r:id="rId14"/>
+    <p:sldId id="268" r:id="rId15"/>
+    <p:sldId id="269" r:id="rId16"/>
+    <p:sldId id="270" r:id="rId17"/>
+    <p:sldId id="264" r:id="rId18"/>
+    <p:sldId id="265" r:id="rId19"/>
+    <p:sldId id="271" r:id="rId20"/>
+    <p:sldId id="272" r:id="rId21"/>
   </p:sldIdLst>
   <p:sldSz cx="12192000" cy="6858000"/>
   <p:notesSz cx="6858000" cy="9144000"/>
@@ -328,7 +327,7 @@
           <a:p>
             <a:fld id="{5007FEB5-473E-4437-BF57-7B173E315AFB}" type="datetimeFigureOut">
               <a:rPr lang="en-US" smtClean="0"/>
-              <a:t>5/9/2020</a:t>
+              <a:t>5/11/2020</a:t>
             </a:fld>
             <a:endParaRPr lang="en-US"/>
           </a:p>
@@ -609,7 +608,7 @@
           <a:p>
             <a:fld id="{5007FEB5-473E-4437-BF57-7B173E315AFB}" type="datetimeFigureOut">
               <a:rPr lang="en-US" smtClean="0"/>
-              <a:t>5/9/2020</a:t>
+              <a:t>5/11/2020</a:t>
             </a:fld>
             <a:endParaRPr lang="en-US"/>
           </a:p>
@@ -801,7 +800,7 @@
           <a:p>
             <a:fld id="{5007FEB5-473E-4437-BF57-7B173E315AFB}" type="datetimeFigureOut">
               <a:rPr lang="en-US" smtClean="0"/>
-              <a:t>5/9/2020</a:t>
+              <a:t>5/11/2020</a:t>
             </a:fld>
             <a:endParaRPr lang="en-US"/>
           </a:p>
@@ -1062,7 +1061,7 @@
           <a:p>
             <a:fld id="{5007FEB5-473E-4437-BF57-7B173E315AFB}" type="datetimeFigureOut">
               <a:rPr lang="en-US" smtClean="0"/>
-              <a:t>5/9/2020</a:t>
+              <a:t>5/11/2020</a:t>
             </a:fld>
             <a:endParaRPr lang="en-US"/>
           </a:p>
@@ -1488,7 +1487,7 @@
           <a:p>
             <a:fld id="{5007FEB5-473E-4437-BF57-7B173E315AFB}" type="datetimeFigureOut">
               <a:rPr lang="en-US" smtClean="0"/>
-              <a:t>5/9/2020</a:t>
+              <a:t>5/11/2020</a:t>
             </a:fld>
             <a:endParaRPr lang="en-US"/>
           </a:p>
@@ -2034,7 +2033,7 @@
           <a:p>
             <a:fld id="{5007FEB5-473E-4437-BF57-7B173E315AFB}" type="datetimeFigureOut">
               <a:rPr lang="en-US" smtClean="0"/>
-              <a:t>5/9/2020</a:t>
+              <a:t>5/11/2020</a:t>
             </a:fld>
             <a:endParaRPr lang="en-US"/>
           </a:p>
@@ -2865,7 +2864,7 @@
           <a:p>
             <a:fld id="{5007FEB5-473E-4437-BF57-7B173E315AFB}" type="datetimeFigureOut">
               <a:rPr lang="en-US" smtClean="0"/>
-              <a:t>5/9/2020</a:t>
+              <a:t>5/11/2020</a:t>
             </a:fld>
             <a:endParaRPr lang="en-US"/>
           </a:p>
@@ -3035,7 +3034,7 @@
           <a:p>
             <a:fld id="{5007FEB5-473E-4437-BF57-7B173E315AFB}" type="datetimeFigureOut">
               <a:rPr lang="en-US" smtClean="0"/>
-              <a:t>5/9/2020</a:t>
+              <a:t>5/11/2020</a:t>
             </a:fld>
             <a:endParaRPr lang="en-US"/>
           </a:p>
@@ -3215,7 +3214,7 @@
           <a:p>
             <a:fld id="{5007FEB5-473E-4437-BF57-7B173E315AFB}" type="datetimeFigureOut">
               <a:rPr lang="en-US" smtClean="0"/>
-              <a:t>5/9/2020</a:t>
+              <a:t>5/11/2020</a:t>
             </a:fld>
             <a:endParaRPr lang="en-US"/>
           </a:p>
@@ -3383,7 +3382,7 @@
           <a:p>
             <a:fld id="{5007FEB5-473E-4437-BF57-7B173E315AFB}" type="datetimeFigureOut">
               <a:rPr lang="en-US" smtClean="0"/>
-              <a:t>5/9/2020</a:t>
+              <a:t>5/11/2020</a:t>
             </a:fld>
             <a:endParaRPr lang="en-US"/>
           </a:p>
@@ -3640,7 +3639,7 @@
           <a:p>
             <a:fld id="{5007FEB5-473E-4437-BF57-7B173E315AFB}" type="datetimeFigureOut">
               <a:rPr lang="en-US" smtClean="0"/>
-              <a:t>5/9/2020</a:t>
+              <a:t>5/11/2020</a:t>
             </a:fld>
             <a:endParaRPr lang="en-US"/>
           </a:p>
@@ -3872,7 +3871,7 @@
           <a:p>
             <a:fld id="{5007FEB5-473E-4437-BF57-7B173E315AFB}" type="datetimeFigureOut">
               <a:rPr lang="en-US" smtClean="0"/>
-              <a:t>5/9/2020</a:t>
+              <a:t>5/11/2020</a:t>
             </a:fld>
             <a:endParaRPr lang="en-US"/>
           </a:p>
@@ -4265,7 +4264,7 @@
           <a:p>
             <a:fld id="{5007FEB5-473E-4437-BF57-7B173E315AFB}" type="datetimeFigureOut">
               <a:rPr lang="en-US" smtClean="0"/>
-              <a:t>5/9/2020</a:t>
+              <a:t>5/11/2020</a:t>
             </a:fld>
             <a:endParaRPr lang="en-US"/>
           </a:p>
@@ -4383,7 +4382,7 @@
           <a:p>
             <a:fld id="{5007FEB5-473E-4437-BF57-7B173E315AFB}" type="datetimeFigureOut">
               <a:rPr lang="en-US" smtClean="0"/>
-              <a:t>5/9/2020</a:t>
+              <a:t>5/11/2020</a:t>
             </a:fld>
             <a:endParaRPr lang="en-US"/>
           </a:p>
@@ -4478,7 +4477,7 @@
           <a:p>
             <a:fld id="{5007FEB5-473E-4437-BF57-7B173E315AFB}" type="datetimeFigureOut">
               <a:rPr lang="en-US" smtClean="0"/>
-              <a:t>5/9/2020</a:t>
+              <a:t>5/11/2020</a:t>
             </a:fld>
             <a:endParaRPr lang="en-US"/>
           </a:p>
@@ -4751,7 +4750,7 @@
           <a:p>
             <a:fld id="{5007FEB5-473E-4437-BF57-7B173E315AFB}" type="datetimeFigureOut">
               <a:rPr lang="en-US" smtClean="0"/>
-              <a:t>5/9/2020</a:t>
+              <a:t>5/11/2020</a:t>
             </a:fld>
             <a:endParaRPr lang="en-US"/>
           </a:p>
@@ -5032,7 +5031,7 @@
           <a:p>
             <a:fld id="{5007FEB5-473E-4437-BF57-7B173E315AFB}" type="datetimeFigureOut">
               <a:rPr lang="en-US" smtClean="0"/>
-              <a:t>5/9/2020</a:t>
+              <a:t>5/11/2020</a:t>
             </a:fld>
             <a:endParaRPr lang="en-US"/>
           </a:p>
@@ -5272,7 +5271,7 @@
           <a:p>
             <a:fld id="{5007FEB5-473E-4437-BF57-7B173E315AFB}" type="datetimeFigureOut">
               <a:rPr lang="en-US" smtClean="0"/>
-              <a:t>5/9/2020</a:t>
+              <a:t>5/11/2020</a:t>
             </a:fld>
             <a:endParaRPr lang="en-US"/>
           </a:p>
@@ -6275,65 +6274,92 @@
       </p:grpSpPr>
       <p:sp>
         <p:nvSpPr>
-          <p:cNvPr id="2" name="Title 1">
+          <p:cNvPr id="2" name="Title 1"/>
+          <p:cNvSpPr>
+            <a:spLocks noGrp="1"/>
+          </p:cNvSpPr>
+          <p:nvPr>
+            <p:ph type="title"/>
+          </p:nvPr>
+        </p:nvSpPr>
+        <p:spPr>
+          <a:xfrm>
+            <a:off x="176091" y="113189"/>
+            <a:ext cx="10515600" cy="1325563"/>
+          </a:xfrm>
+        </p:spPr>
+        <p:txBody>
+          <a:bodyPr/>
+          <a:lstStyle/>
+          <a:p>
+            <a:r>
+              <a:rPr lang="en-US" dirty="0"/>
+              <a:t>Interaction viewpoint</a:t>
+            </a:r>
+          </a:p>
+        </p:txBody>
+      </p:sp>
+      <p:sp>
+        <p:nvSpPr>
+          <p:cNvPr id="3" name="Content Placeholder 2"/>
+          <p:cNvSpPr>
+            <a:spLocks noGrp="1"/>
+          </p:cNvSpPr>
+          <p:nvPr>
+            <p:ph idx="1"/>
+          </p:nvPr>
+        </p:nvSpPr>
+        <p:spPr>
+          <a:xfrm>
+            <a:off x="176091" y="1438752"/>
+            <a:ext cx="2929485" cy="503872"/>
+          </a:xfrm>
+        </p:spPr>
+        <p:txBody>
+          <a:bodyPr/>
+          <a:lstStyle/>
+          <a:p>
+            <a:r>
+              <a:rPr lang="en-US" dirty="0"/>
+              <a:t>Admin functions</a:t>
+            </a:r>
+          </a:p>
+        </p:txBody>
+      </p:sp>
+      <p:pic>
+        <p:nvPicPr>
+          <p:cNvPr id="4" name="Picture 3"/>
+          <p:cNvPicPr>
+            <a:picLocks noChangeAspect="1"/>
+          </p:cNvPicPr>
+          <p:nvPr/>
+        </p:nvPicPr>
+        <p:blipFill>
+          <a:blip r:embed="rId2">
             <a:extLst>
-              <a:ext uri="{FF2B5EF4-FFF2-40B4-BE49-F238E27FC236}">
-                <a16:creationId xmlns:a16="http://schemas.microsoft.com/office/drawing/2014/main" id="{FAAFDC01-7CA2-4708-9D0C-1EE3FDB1192F}"/>
+              <a:ext uri="{28A0092B-C50C-407E-A947-70E740481C1C}">
+                <a14:useLocalDpi xmlns:a14="http://schemas.microsoft.com/office/drawing/2010/main" val="0"/>
               </a:ext>
             </a:extLst>
-          </p:cNvPr>
-          <p:cNvSpPr>
-            <a:spLocks noGrp="1"/>
-          </p:cNvSpPr>
-          <p:nvPr>
-            <p:ph type="title"/>
-          </p:nvPr>
-        </p:nvSpPr>
-        <p:spPr/>
-        <p:txBody>
-          <a:bodyPr/>
-          <a:lstStyle/>
-          <a:p>
-            <a:r>
-              <a:rPr lang="en-US" dirty="0"/>
-              <a:t>Structure viewpoint 4</a:t>
-            </a:r>
-          </a:p>
-        </p:txBody>
-      </p:sp>
-      <p:pic>
-        <p:nvPicPr>
-          <p:cNvPr id="5" name="Content Placeholder 4">
-            <a:extLst>
-              <a:ext uri="{FF2B5EF4-FFF2-40B4-BE49-F238E27FC236}">
-                <a16:creationId xmlns:a16="http://schemas.microsoft.com/office/drawing/2014/main" id="{78DDAA6A-FDFA-4353-B43B-D5B414EEF7F2}"/>
-              </a:ext>
-            </a:extLst>
-          </p:cNvPr>
-          <p:cNvPicPr>
-            <a:picLocks noGrp="1" noChangeAspect="1"/>
-          </p:cNvPicPr>
-          <p:nvPr>
-            <p:ph idx="1"/>
-          </p:nvPr>
-        </p:nvPicPr>
-        <p:blipFill>
-          <a:blip r:embed="rId2"/>
+          </a:blip>
           <a:stretch>
             <a:fillRect/>
           </a:stretch>
         </p:blipFill>
         <p:spPr>
           <a:xfrm>
-            <a:off x="1961964" y="-2593273"/>
-            <a:ext cx="8072762" cy="9904398"/>
-          </a:xfrm>
+            <a:off x="2299318" y="2081372"/>
+            <a:ext cx="7593364" cy="4663439"/>
+          </a:xfrm>
+          <a:prstGeom prst="rect">
+            <a:avLst/>
+          </a:prstGeom>
         </p:spPr>
       </p:pic>
     </p:spTree>
     <p:extLst>
       <p:ext uri="{BB962C8B-B14F-4D97-AF65-F5344CB8AC3E}">
-        <p14:creationId xmlns:p14="http://schemas.microsoft.com/office/powerpoint/2010/main" val="2387485105"/>
+        <p14:creationId xmlns:p14="http://schemas.microsoft.com/office/powerpoint/2010/main" val="66912999"/>
       </p:ext>
     </p:extLst>
   </p:cSld>
@@ -6362,18 +6388,18 @@
       </p:grpSpPr>
       <p:sp>
         <p:nvSpPr>
-          <p:cNvPr id="2" name="Title 1"/>
-          <p:cNvSpPr>
-            <a:spLocks noGrp="1"/>
-          </p:cNvSpPr>
-          <p:nvPr>
-            <p:ph type="title"/>
-          </p:nvPr>
-        </p:nvSpPr>
-        <p:spPr>
-          <a:xfrm>
-            <a:off x="176091" y="113189"/>
-            <a:ext cx="10515600" cy="1325563"/>
+          <p:cNvPr id="3" name="Content Placeholder 2"/>
+          <p:cNvSpPr>
+            <a:spLocks noGrp="1"/>
+          </p:cNvSpPr>
+          <p:nvPr>
+            <p:ph idx="1"/>
+          </p:nvPr>
+        </p:nvSpPr>
+        <p:spPr>
+          <a:xfrm>
+            <a:off x="371063" y="353877"/>
+            <a:ext cx="2110880" cy="621484"/>
           </a:xfrm>
         </p:spPr>
         <p:txBody>
@@ -6382,34 +6408,7 @@
           <a:p>
             <a:r>
               <a:rPr lang="en-US" dirty="0"/>
-              <a:t>Interaction viewpoint</a:t>
-            </a:r>
-          </a:p>
-        </p:txBody>
-      </p:sp>
-      <p:sp>
-        <p:nvSpPr>
-          <p:cNvPr id="3" name="Content Placeholder 2"/>
-          <p:cNvSpPr>
-            <a:spLocks noGrp="1"/>
-          </p:cNvSpPr>
-          <p:nvPr>
-            <p:ph idx="1"/>
-          </p:nvPr>
-        </p:nvSpPr>
-        <p:spPr>
-          <a:xfrm>
-            <a:off x="176091" y="1438752"/>
-            <a:ext cx="2929485" cy="503872"/>
-          </a:xfrm>
-        </p:spPr>
-        <p:txBody>
-          <a:bodyPr/>
-          <a:lstStyle/>
-          <a:p>
-            <a:r>
-              <a:rPr lang="en-US" dirty="0"/>
-              <a:t>Admin functions</a:t>
+              <a:t>User Login</a:t>
             </a:r>
           </a:p>
         </p:txBody>
@@ -6436,8 +6435,8 @@
         </p:blipFill>
         <p:spPr>
           <a:xfrm>
-            <a:off x="2299318" y="2081372"/>
-            <a:ext cx="7593364" cy="4663439"/>
+            <a:off x="1426503" y="843887"/>
+            <a:ext cx="9314330" cy="5882639"/>
           </a:xfrm>
           <a:prstGeom prst="rect">
             <a:avLst/>
@@ -6447,7 +6446,7 @@
     </p:spTree>
     <p:extLst>
       <p:ext uri="{BB962C8B-B14F-4D97-AF65-F5344CB8AC3E}">
-        <p14:creationId xmlns:p14="http://schemas.microsoft.com/office/powerpoint/2010/main" val="66912999"/>
+        <p14:creationId xmlns:p14="http://schemas.microsoft.com/office/powerpoint/2010/main" val="1848065039"/>
       </p:ext>
     </p:extLst>
   </p:cSld>
@@ -6486,8 +6485,8 @@
         </p:nvSpPr>
         <p:spPr>
           <a:xfrm>
-            <a:off x="371063" y="353877"/>
-            <a:ext cx="2110880" cy="621484"/>
+            <a:off x="231725" y="397419"/>
+            <a:ext cx="1945417" cy="638901"/>
           </a:xfrm>
         </p:spPr>
         <p:txBody>
@@ -6496,7 +6495,7 @@
           <a:p>
             <a:r>
               <a:rPr lang="en-US" dirty="0"/>
-              <a:t>User Login</a:t>
+              <a:t>Booking</a:t>
             </a:r>
           </a:p>
         </p:txBody>
@@ -6523,8 +6522,8 @@
         </p:blipFill>
         <p:spPr>
           <a:xfrm>
-            <a:off x="1426503" y="843887"/>
-            <a:ext cx="9314330" cy="5882639"/>
+            <a:off x="1658470" y="1036320"/>
+            <a:ext cx="8875060" cy="5442857"/>
           </a:xfrm>
           <a:prstGeom prst="rect">
             <a:avLst/>
@@ -6534,7 +6533,7 @@
     </p:spTree>
     <p:extLst>
       <p:ext uri="{BB962C8B-B14F-4D97-AF65-F5344CB8AC3E}">
-        <p14:creationId xmlns:p14="http://schemas.microsoft.com/office/powerpoint/2010/main" val="1848065039"/>
+        <p14:creationId xmlns:p14="http://schemas.microsoft.com/office/powerpoint/2010/main" val="2983899652"/>
       </p:ext>
     </p:extLst>
   </p:cSld>
@@ -6573,8 +6572,8 @@
         </p:nvSpPr>
         <p:spPr>
           <a:xfrm>
-            <a:off x="231725" y="397419"/>
-            <a:ext cx="1945417" cy="638901"/>
+            <a:off x="109805" y="319041"/>
+            <a:ext cx="5245966" cy="508273"/>
           </a:xfrm>
         </p:spPr>
         <p:txBody>
@@ -6583,7 +6582,7 @@
           <a:p>
             <a:r>
               <a:rPr lang="en-US" dirty="0"/>
-              <a:t>Booking</a:t>
+              <a:t>Guest and Support interactions</a:t>
             </a:r>
           </a:p>
         </p:txBody>
@@ -6610,8 +6609,8 @@
         </p:blipFill>
         <p:spPr>
           <a:xfrm>
-            <a:off x="1658470" y="1036320"/>
-            <a:ext cx="8875060" cy="5442857"/>
+            <a:off x="1296140" y="1113518"/>
+            <a:ext cx="9599720" cy="5425441"/>
           </a:xfrm>
           <a:prstGeom prst="rect">
             <a:avLst/>
@@ -6621,7 +6620,7 @@
     </p:spTree>
     <p:extLst>
       <p:ext uri="{BB962C8B-B14F-4D97-AF65-F5344CB8AC3E}">
-        <p14:creationId xmlns:p14="http://schemas.microsoft.com/office/powerpoint/2010/main" val="2983899652"/>
+        <p14:creationId xmlns:p14="http://schemas.microsoft.com/office/powerpoint/2010/main" val="3992091444"/>
       </p:ext>
     </p:extLst>
   </p:cSld>
@@ -6650,18 +6649,18 @@
       </p:grpSpPr>
       <p:sp>
         <p:nvSpPr>
-          <p:cNvPr id="3" name="Content Placeholder 2"/>
-          <p:cNvSpPr>
-            <a:spLocks noGrp="1"/>
-          </p:cNvSpPr>
-          <p:nvPr>
-            <p:ph idx="1"/>
-          </p:nvPr>
-        </p:nvSpPr>
-        <p:spPr>
-          <a:xfrm>
-            <a:off x="109805" y="319041"/>
-            <a:ext cx="5245966" cy="508273"/>
+          <p:cNvPr id="2" name="Title 1"/>
+          <p:cNvSpPr>
+            <a:spLocks noGrp="1"/>
+          </p:cNvSpPr>
+          <p:nvPr>
+            <p:ph type="title"/>
+          </p:nvPr>
+        </p:nvSpPr>
+        <p:spPr>
+          <a:xfrm>
+            <a:off x="150222" y="1"/>
+            <a:ext cx="5074921" cy="1027612"/>
           </a:xfrm>
         </p:spPr>
         <p:txBody>
@@ -6670,14 +6669,14 @@
           <a:p>
             <a:r>
               <a:rPr lang="en-US" dirty="0"/>
-              <a:t>Guest and Support interactions</a:t>
+              <a:t>Database Design</a:t>
             </a:r>
           </a:p>
         </p:txBody>
       </p:sp>
       <p:pic>
         <p:nvPicPr>
-          <p:cNvPr id="4" name="Picture 3"/>
+          <p:cNvPr id="3" name="Picture 2"/>
           <p:cNvPicPr>
             <a:picLocks noChangeAspect="1"/>
           </p:cNvPicPr>
@@ -6697,8 +6696,8 @@
         </p:blipFill>
         <p:spPr>
           <a:xfrm>
-            <a:off x="1296140" y="1113518"/>
-            <a:ext cx="9599720" cy="5425441"/>
+            <a:off x="1300155" y="947713"/>
+            <a:ext cx="9591690" cy="5730969"/>
           </a:xfrm>
           <a:prstGeom prst="rect">
             <a:avLst/>
@@ -6708,7 +6707,7 @@
     </p:spTree>
     <p:extLst>
       <p:ext uri="{BB962C8B-B14F-4D97-AF65-F5344CB8AC3E}">
-        <p14:creationId xmlns:p14="http://schemas.microsoft.com/office/powerpoint/2010/main" val="3992091444"/>
+        <p14:creationId xmlns:p14="http://schemas.microsoft.com/office/powerpoint/2010/main" val="1005654175"/>
       </p:ext>
     </p:extLst>
   </p:cSld>
@@ -6745,93 +6744,6 @@
             <p:ph type="title"/>
           </p:nvPr>
         </p:nvSpPr>
-        <p:spPr>
-          <a:xfrm>
-            <a:off x="150222" y="1"/>
-            <a:ext cx="5074921" cy="1027612"/>
-          </a:xfrm>
-        </p:spPr>
-        <p:txBody>
-          <a:bodyPr/>
-          <a:lstStyle/>
-          <a:p>
-            <a:r>
-              <a:rPr lang="en-US" dirty="0"/>
-              <a:t>Database Design</a:t>
-            </a:r>
-          </a:p>
-        </p:txBody>
-      </p:sp>
-      <p:pic>
-        <p:nvPicPr>
-          <p:cNvPr id="3" name="Picture 2"/>
-          <p:cNvPicPr>
-            <a:picLocks noChangeAspect="1"/>
-          </p:cNvPicPr>
-          <p:nvPr/>
-        </p:nvPicPr>
-        <p:blipFill>
-          <a:blip r:embed="rId2">
-            <a:extLst>
-              <a:ext uri="{28A0092B-C50C-407E-A947-70E740481C1C}">
-                <a14:useLocalDpi xmlns:a14="http://schemas.microsoft.com/office/drawing/2010/main" val="0"/>
-              </a:ext>
-            </a:extLst>
-          </a:blip>
-          <a:stretch>
-            <a:fillRect/>
-          </a:stretch>
-        </p:blipFill>
-        <p:spPr>
-          <a:xfrm>
-            <a:off x="1300155" y="947713"/>
-            <a:ext cx="9591690" cy="5730969"/>
-          </a:xfrm>
-          <a:prstGeom prst="rect">
-            <a:avLst/>
-          </a:prstGeom>
-        </p:spPr>
-      </p:pic>
-    </p:spTree>
-    <p:extLst>
-      <p:ext uri="{BB962C8B-B14F-4D97-AF65-F5344CB8AC3E}">
-        <p14:creationId xmlns:p14="http://schemas.microsoft.com/office/powerpoint/2010/main" val="1005654175"/>
-      </p:ext>
-    </p:extLst>
-  </p:cSld>
-  <p:clrMapOvr>
-    <a:masterClrMapping/>
-  </p:clrMapOvr>
-</p:sld>
-</file>
-
-<file path=ppt/slides/slide19.xml><?xml version="1.0" encoding="utf-8"?>
-<p:sld xmlns:a="http://schemas.openxmlformats.org/drawingml/2006/main" xmlns:r="http://schemas.openxmlformats.org/officeDocument/2006/relationships" xmlns:p="http://schemas.openxmlformats.org/presentationml/2006/main">
-  <p:cSld>
-    <p:spTree>
-      <p:nvGrpSpPr>
-        <p:cNvPr id="1" name=""/>
-        <p:cNvGrpSpPr/>
-        <p:nvPr/>
-      </p:nvGrpSpPr>
-      <p:grpSpPr>
-        <a:xfrm>
-          <a:off x="0" y="0"/>
-          <a:ext cx="0" cy="0"/>
-          <a:chOff x="0" y="0"/>
-          <a:chExt cx="0" cy="0"/>
-        </a:xfrm>
-      </p:grpSpPr>
-      <p:sp>
-        <p:nvSpPr>
-          <p:cNvPr id="2" name="Title 1"/>
-          <p:cNvSpPr>
-            <a:spLocks noGrp="1"/>
-          </p:cNvSpPr>
-          <p:nvPr>
-            <p:ph type="title"/>
-          </p:nvPr>
-        </p:nvSpPr>
         <p:spPr/>
         <p:txBody>
           <a:bodyPr/>
@@ -6960,88 +6872,7 @@
 </p:sld>
 </file>
 
-<file path=ppt/slides/slide2.xml><?xml version="1.0" encoding="utf-8"?>
-<p:sld xmlns:a="http://schemas.openxmlformats.org/drawingml/2006/main" xmlns:r="http://schemas.openxmlformats.org/officeDocument/2006/relationships" xmlns:p="http://schemas.openxmlformats.org/presentationml/2006/main">
-  <p:cSld>
-    <p:spTree>
-      <p:nvGrpSpPr>
-        <p:cNvPr id="1" name=""/>
-        <p:cNvGrpSpPr/>
-        <p:nvPr/>
-      </p:nvGrpSpPr>
-      <p:grpSpPr>
-        <a:xfrm>
-          <a:off x="0" y="0"/>
-          <a:ext cx="0" cy="0"/>
-          <a:chOff x="0" y="0"/>
-          <a:chExt cx="0" cy="0"/>
-        </a:xfrm>
-      </p:grpSpPr>
-      <p:sp>
-        <p:nvSpPr>
-          <p:cNvPr id="2" name="Title 1"/>
-          <p:cNvSpPr>
-            <a:spLocks noGrp="1"/>
-          </p:cNvSpPr>
-          <p:nvPr>
-            <p:ph type="title"/>
-          </p:nvPr>
-        </p:nvSpPr>
-        <p:spPr/>
-        <p:txBody>
-          <a:bodyPr>
-            <a:normAutofit/>
-          </a:bodyPr>
-          <a:lstStyle/>
-          <a:p>
-            <a:r>
-              <a:rPr lang="en-US" dirty="0"/>
-              <a:t>Revised Problem Statement.</a:t>
-            </a:r>
-          </a:p>
-        </p:txBody>
-      </p:sp>
-      <p:sp>
-        <p:nvSpPr>
-          <p:cNvPr id="3" name="Content Placeholder 2"/>
-          <p:cNvSpPr>
-            <a:spLocks noGrp="1"/>
-          </p:cNvSpPr>
-          <p:nvPr>
-            <p:ph idx="1"/>
-          </p:nvPr>
-        </p:nvSpPr>
-        <p:spPr>
-          <a:xfrm>
-            <a:off x="838200" y="1825625"/>
-            <a:ext cx="10515600" cy="4351338"/>
-          </a:xfrm>
-        </p:spPr>
-        <p:txBody>
-          <a:bodyPr/>
-          <a:lstStyle/>
-          <a:p>
-            <a:r>
-              <a:rPr lang="en-US" dirty="0"/>
-              <a:t>The main problem the web application was created for improving was that the company didn’t use any software in order to keep track of their data , the whole sequence was made manually. Also the booking of a hotel or a package was made manually by contacting the company in order to view current offers and book a hotel or a package through them.</a:t>
-            </a:r>
-          </a:p>
-        </p:txBody>
-      </p:sp>
-    </p:spTree>
-    <p:extLst>
-      <p:ext uri="{BB962C8B-B14F-4D97-AF65-F5344CB8AC3E}">
-        <p14:creationId xmlns:p14="http://schemas.microsoft.com/office/powerpoint/2010/main" val="289922032"/>
-      </p:ext>
-    </p:extLst>
-  </p:cSld>
-  <p:clrMapOvr>
-    <a:masterClrMapping/>
-  </p:clrMapOvr>
-</p:sld>
-</file>
-
-<file path=ppt/slides/slide20.xml><?xml version="1.0" encoding="utf-8"?>
+<file path=ppt/slides/slide19.xml><?xml version="1.0" encoding="utf-8"?>
 <p:sld xmlns:a="http://schemas.openxmlformats.org/drawingml/2006/main" xmlns:r="http://schemas.openxmlformats.org/officeDocument/2006/relationships" xmlns:p="http://schemas.openxmlformats.org/presentationml/2006/main">
   <p:cSld>
     <p:spTree>
@@ -7131,7 +6962,88 @@
 </p:sld>
 </file>
 
-<file path=ppt/slides/slide21.xml><?xml version="1.0" encoding="utf-8"?>
+<file path=ppt/slides/slide2.xml><?xml version="1.0" encoding="utf-8"?>
+<p:sld xmlns:a="http://schemas.openxmlformats.org/drawingml/2006/main" xmlns:r="http://schemas.openxmlformats.org/officeDocument/2006/relationships" xmlns:p="http://schemas.openxmlformats.org/presentationml/2006/main">
+  <p:cSld>
+    <p:spTree>
+      <p:nvGrpSpPr>
+        <p:cNvPr id="1" name=""/>
+        <p:cNvGrpSpPr/>
+        <p:nvPr/>
+      </p:nvGrpSpPr>
+      <p:grpSpPr>
+        <a:xfrm>
+          <a:off x="0" y="0"/>
+          <a:ext cx="0" cy="0"/>
+          <a:chOff x="0" y="0"/>
+          <a:chExt cx="0" cy="0"/>
+        </a:xfrm>
+      </p:grpSpPr>
+      <p:sp>
+        <p:nvSpPr>
+          <p:cNvPr id="2" name="Title 1"/>
+          <p:cNvSpPr>
+            <a:spLocks noGrp="1"/>
+          </p:cNvSpPr>
+          <p:nvPr>
+            <p:ph type="title"/>
+          </p:nvPr>
+        </p:nvSpPr>
+        <p:spPr/>
+        <p:txBody>
+          <a:bodyPr>
+            <a:normAutofit/>
+          </a:bodyPr>
+          <a:lstStyle/>
+          <a:p>
+            <a:r>
+              <a:rPr lang="en-US" dirty="0"/>
+              <a:t>Revised Problem Statement.</a:t>
+            </a:r>
+          </a:p>
+        </p:txBody>
+      </p:sp>
+      <p:sp>
+        <p:nvSpPr>
+          <p:cNvPr id="3" name="Content Placeholder 2"/>
+          <p:cNvSpPr>
+            <a:spLocks noGrp="1"/>
+          </p:cNvSpPr>
+          <p:nvPr>
+            <p:ph idx="1"/>
+          </p:nvPr>
+        </p:nvSpPr>
+        <p:spPr>
+          <a:xfrm>
+            <a:off x="838200" y="1825625"/>
+            <a:ext cx="10515600" cy="4351338"/>
+          </a:xfrm>
+        </p:spPr>
+        <p:txBody>
+          <a:bodyPr/>
+          <a:lstStyle/>
+          <a:p>
+            <a:r>
+              <a:rPr lang="en-US" dirty="0"/>
+              <a:t>The main problem the web application was created for improving was that the company didn’t use any software in order to keep track of their data , the whole sequence was made manually. Also the booking of a hotel or a package was made manually by contacting the company in order to view current offers and book a hotel or a package through them.</a:t>
+            </a:r>
+          </a:p>
+        </p:txBody>
+      </p:sp>
+    </p:spTree>
+    <p:extLst>
+      <p:ext uri="{BB962C8B-B14F-4D97-AF65-F5344CB8AC3E}">
+        <p14:creationId xmlns:p14="http://schemas.microsoft.com/office/powerpoint/2010/main" val="289922032"/>
+      </p:ext>
+    </p:extLst>
+  </p:cSld>
+  <p:clrMapOvr>
+    <a:masterClrMapping/>
+  </p:clrMapOvr>
+</p:sld>
+</file>
+
+<file path=ppt/slides/slide20.xml><?xml version="1.0" encoding="utf-8"?>
 <p:sld xmlns:a="http://schemas.openxmlformats.org/drawingml/2006/main" xmlns:r="http://schemas.openxmlformats.org/officeDocument/2006/relationships" xmlns:p="http://schemas.openxmlformats.org/presentationml/2006/main">
   <p:cSld>
     <p:spTree>

</xml_diff>